<commit_message>
Documentation changes and path fixes
</commit_message>
<xml_diff>
--- a/documentation/Generating GCODE from unrouted PCB.pptx
+++ b/documentation/Generating GCODE from unrouted PCB.pptx
@@ -107,7 +107,41 @@
       </a:defRPr>
     </a:lvl9pPr>
   </p:defaultTextStyle>
+  <p:extLst>
+    <p:ext uri="{EFAFB233-063F-42B5-8137-9DF3F51BA10A}">
+      <p15:sldGuideLst xmlns:p15="http://schemas.microsoft.com/office/powerpoint/2012/main"/>
+    </p:ext>
+  </p:extLst>
 </p:presentation>
+</file>
+
+<file path=ppt/changesInfos/changesInfo1.xml><?xml version="1.0" encoding="utf-8"?>
+<pc:chgInfo xmlns:a="http://schemas.openxmlformats.org/drawingml/2006/main" xmlns:r="http://schemas.openxmlformats.org/officeDocument/2006/relationships" xmlns:ac="http://schemas.microsoft.com/office/drawing/2013/main/command" xmlns:pc="http://schemas.microsoft.com/office/powerpoint/2013/main/command">
+  <pc:docChgLst>
+    <pc:chgData name="Franco Harding Garcia" userId="3e9af8f7f92de600" providerId="LiveId" clId="{1DC4CC4F-EB9E-4A12-A68A-150A6A6EB07A}"/>
+    <pc:docChg chg="undo custSel modSld">
+      <pc:chgData name="Franco Harding Garcia" userId="3e9af8f7f92de600" providerId="LiveId" clId="{1DC4CC4F-EB9E-4A12-A68A-150A6A6EB07A}" dt="2023-08-10T15:53:26.987" v="245" actId="20577"/>
+      <pc:docMkLst>
+        <pc:docMk/>
+      </pc:docMkLst>
+      <pc:sldChg chg="modSp mod">
+        <pc:chgData name="Franco Harding Garcia" userId="3e9af8f7f92de600" providerId="LiveId" clId="{1DC4CC4F-EB9E-4A12-A68A-150A6A6EB07A}" dt="2023-08-10T15:53:26.987" v="245" actId="20577"/>
+        <pc:sldMkLst>
+          <pc:docMk/>
+          <pc:sldMk cId="1785732437" sldId="257"/>
+        </pc:sldMkLst>
+        <pc:spChg chg="mod">
+          <ac:chgData name="Franco Harding Garcia" userId="3e9af8f7f92de600" providerId="LiveId" clId="{1DC4CC4F-EB9E-4A12-A68A-150A6A6EB07A}" dt="2023-08-10T15:53:26.987" v="245" actId="20577"/>
+          <ac:spMkLst>
+            <pc:docMk/>
+            <pc:sldMk cId="1785732437" sldId="257"/>
+            <ac:spMk id="3" creationId="{74AD95B3-A522-5143-4415-9FF986C02E48}"/>
+          </ac:spMkLst>
+        </pc:spChg>
+      </pc:sldChg>
+    </pc:docChg>
+  </pc:docChgLst>
+</pc:chgInfo>
 </file>
 
 <file path=ppt/slideLayouts/slideLayout1.xml><?xml version="1.0" encoding="utf-8"?>
@@ -257,7 +291,7 @@
           <a:p>
             <a:fld id="{42A611B1-A2F5-4863-8B42-E344B47E7AC0}" type="datetimeFigureOut">
               <a:rPr lang="en-US" smtClean="0"/>
-              <a:t>6/28/2023</a:t>
+              <a:t>8/10/2023</a:t>
             </a:fld>
             <a:endParaRPr lang="en-US"/>
           </a:p>
@@ -455,7 +489,7 @@
           <a:p>
             <a:fld id="{42A611B1-A2F5-4863-8B42-E344B47E7AC0}" type="datetimeFigureOut">
               <a:rPr lang="en-US" smtClean="0"/>
-              <a:t>6/28/2023</a:t>
+              <a:t>8/10/2023</a:t>
             </a:fld>
             <a:endParaRPr lang="en-US"/>
           </a:p>
@@ -663,7 +697,7 @@
           <a:p>
             <a:fld id="{42A611B1-A2F5-4863-8B42-E344B47E7AC0}" type="datetimeFigureOut">
               <a:rPr lang="en-US" smtClean="0"/>
-              <a:t>6/28/2023</a:t>
+              <a:t>8/10/2023</a:t>
             </a:fld>
             <a:endParaRPr lang="en-US"/>
           </a:p>
@@ -861,7 +895,7 @@
           <a:p>
             <a:fld id="{42A611B1-A2F5-4863-8B42-E344B47E7AC0}" type="datetimeFigureOut">
               <a:rPr lang="en-US" smtClean="0"/>
-              <a:t>6/28/2023</a:t>
+              <a:t>8/10/2023</a:t>
             </a:fld>
             <a:endParaRPr lang="en-US"/>
           </a:p>
@@ -1136,7 +1170,7 @@
           <a:p>
             <a:fld id="{42A611B1-A2F5-4863-8B42-E344B47E7AC0}" type="datetimeFigureOut">
               <a:rPr lang="en-US" smtClean="0"/>
-              <a:t>6/28/2023</a:t>
+              <a:t>8/10/2023</a:t>
             </a:fld>
             <a:endParaRPr lang="en-US"/>
           </a:p>
@@ -1401,7 +1435,7 @@
           <a:p>
             <a:fld id="{42A611B1-A2F5-4863-8B42-E344B47E7AC0}" type="datetimeFigureOut">
               <a:rPr lang="en-US" smtClean="0"/>
-              <a:t>6/28/2023</a:t>
+              <a:t>8/10/2023</a:t>
             </a:fld>
             <a:endParaRPr lang="en-US"/>
           </a:p>
@@ -1813,7 +1847,7 @@
           <a:p>
             <a:fld id="{42A611B1-A2F5-4863-8B42-E344B47E7AC0}" type="datetimeFigureOut">
               <a:rPr lang="en-US" smtClean="0"/>
-              <a:t>6/28/2023</a:t>
+              <a:t>8/10/2023</a:t>
             </a:fld>
             <a:endParaRPr lang="en-US"/>
           </a:p>
@@ -1954,7 +1988,7 @@
           <a:p>
             <a:fld id="{42A611B1-A2F5-4863-8B42-E344B47E7AC0}" type="datetimeFigureOut">
               <a:rPr lang="en-US" smtClean="0"/>
-              <a:t>6/28/2023</a:t>
+              <a:t>8/10/2023</a:t>
             </a:fld>
             <a:endParaRPr lang="en-US"/>
           </a:p>
@@ -2067,7 +2101,7 @@
           <a:p>
             <a:fld id="{42A611B1-A2F5-4863-8B42-E344B47E7AC0}" type="datetimeFigureOut">
               <a:rPr lang="en-US" smtClean="0"/>
-              <a:t>6/28/2023</a:t>
+              <a:t>8/10/2023</a:t>
             </a:fld>
             <a:endParaRPr lang="en-US"/>
           </a:p>
@@ -2378,7 +2412,7 @@
           <a:p>
             <a:fld id="{42A611B1-A2F5-4863-8B42-E344B47E7AC0}" type="datetimeFigureOut">
               <a:rPr lang="en-US" smtClean="0"/>
-              <a:t>6/28/2023</a:t>
+              <a:t>8/10/2023</a:t>
             </a:fld>
             <a:endParaRPr lang="en-US"/>
           </a:p>
@@ -2666,7 +2700,7 @@
           <a:p>
             <a:fld id="{42A611B1-A2F5-4863-8B42-E344B47E7AC0}" type="datetimeFigureOut">
               <a:rPr lang="en-US" smtClean="0"/>
-              <a:t>6/28/2023</a:t>
+              <a:t>8/10/2023</a:t>
             </a:fld>
             <a:endParaRPr lang="en-US"/>
           </a:p>
@@ -2907,7 +2941,7 @@
           <a:p>
             <a:fld id="{42A611B1-A2F5-4863-8B42-E344B47E7AC0}" type="datetimeFigureOut">
               <a:rPr lang="en-US" smtClean="0"/>
-              <a:t>6/28/2023</a:t>
+              <a:t>8/10/2023</a:t>
             </a:fld>
             <a:endParaRPr lang="en-US"/>
           </a:p>
@@ -3501,11 +3535,11 @@
           <a:p>
             <a:r>
               <a:rPr lang="en-US" dirty="0"/>
-              <a:t>Valid netlist from </a:t>
+              <a:t>Valid netlist compatible with </a:t>
             </a:r>
             <a:r>
               <a:rPr lang="en-US" dirty="0" err="1"/>
-              <a:t>Eeschema</a:t>
+              <a:t>EEschema</a:t>
             </a:r>
             <a:r>
               <a:rPr lang="en-US" dirty="0"/>

</xml_diff>